<commit_message>
add chapter 6 practice
</commit_message>
<xml_diff>
--- a/slides/Chapter6.pptx
+++ b/slides/Chapter6.pptx
@@ -6,7 +6,7 @@
     <p:sldMasterId id="2147483660" r:id="rId2"/>
   </p:sldMasterIdLst>
   <p:notesMasterIdLst>
-    <p:notesMasterId r:id="rId21"/>
+    <p:notesMasterId r:id="rId26"/>
   </p:notesMasterIdLst>
   <p:sldIdLst>
     <p:sldId id="259" r:id="rId3"/>
@@ -27,11 +27,16 @@
     <p:sldId id="645" r:id="rId18"/>
     <p:sldId id="638" r:id="rId19"/>
     <p:sldId id="646" r:id="rId20"/>
+    <p:sldId id="647" r:id="rId21"/>
+    <p:sldId id="507" r:id="rId22"/>
+    <p:sldId id="648" r:id="rId23"/>
+    <p:sldId id="649" r:id="rId24"/>
+    <p:sldId id="650" r:id="rId25"/>
   </p:sldIdLst>
   <p:sldSz cx="12192000" cy="6858000"/>
   <p:notesSz cx="6858000" cy="9144000"/>
   <p:custDataLst>
-    <p:tags r:id="rId22"/>
+    <p:tags r:id="rId27"/>
   </p:custDataLst>
   <p:defaultTextStyle>
     <a:defPPr>
@@ -953,6 +958,342 @@
     <p:extLst>
       <p:ext uri="{BB962C8B-B14F-4D97-AF65-F5344CB8AC3E}">
         <p14:creationId xmlns:p14="http://schemas.microsoft.com/office/powerpoint/2010/main" val="441433032"/>
+      </p:ext>
+    </p:extLst>
+  </p:cSld>
+  <p:clrMapOvr>
+    <a:masterClrMapping/>
+  </p:clrMapOvr>
+</p:notes>
+</file>
+
+<file path=ppt/notesSlides/notesSlide15.xml><?xml version="1.0" encoding="utf-8"?>
+<p:notes xmlns:a="http://schemas.openxmlformats.org/drawingml/2006/main" xmlns:r="http://schemas.openxmlformats.org/officeDocument/2006/relationships" xmlns:p="http://schemas.openxmlformats.org/presentationml/2006/main">
+  <p:cSld>
+    <p:spTree>
+      <p:nvGrpSpPr>
+        <p:cNvPr id="1" name=""/>
+        <p:cNvGrpSpPr/>
+        <p:nvPr/>
+      </p:nvGrpSpPr>
+      <p:grpSpPr>
+        <a:xfrm>
+          <a:off x="0" y="0"/>
+          <a:ext cx="0" cy="0"/>
+          <a:chOff x="0" y="0"/>
+          <a:chExt cx="0" cy="0"/>
+        </a:xfrm>
+      </p:grpSpPr>
+      <p:sp>
+        <p:nvSpPr>
+          <p:cNvPr id="2" name="幻灯片图像占位符 1"/>
+          <p:cNvSpPr>
+            <a:spLocks noGrp="1" noRot="1" noChangeAspect="1"/>
+          </p:cNvSpPr>
+          <p:nvPr>
+            <p:ph type="sldImg"/>
+          </p:nvPr>
+        </p:nvSpPr>
+        <p:spPr/>
+      </p:sp>
+      <p:sp>
+        <p:nvSpPr>
+          <p:cNvPr id="3" name="备注占位符 2"/>
+          <p:cNvSpPr>
+            <a:spLocks noGrp="1"/>
+          </p:cNvSpPr>
+          <p:nvPr>
+            <p:ph type="body" idx="1"/>
+          </p:nvPr>
+        </p:nvSpPr>
+        <p:spPr/>
+        <p:txBody>
+          <a:bodyPr/>
+          <a:lstStyle/>
+          <a:p>
+            <a:endParaRPr lang="zh-CN" altLang="en-US" dirty="0"/>
+          </a:p>
+        </p:txBody>
+      </p:sp>
+      <p:sp>
+        <p:nvSpPr>
+          <p:cNvPr id="4" name="灯片编号占位符 3"/>
+          <p:cNvSpPr>
+            <a:spLocks noGrp="1"/>
+          </p:cNvSpPr>
+          <p:nvPr>
+            <p:ph type="sldNum" sz="quarter" idx="5"/>
+          </p:nvPr>
+        </p:nvSpPr>
+        <p:spPr/>
+        <p:txBody>
+          <a:bodyPr/>
+          <a:lstStyle/>
+          <a:p>
+            <a:fld id="{7421D011-EC35-498F-ADE3-3197FF1A64D5}" type="slidenum">
+              <a:rPr lang="zh-CN" altLang="en-US" smtClean="0"/>
+              <a:t>20</a:t>
+            </a:fld>
+            <a:endParaRPr lang="zh-CN" altLang="en-US"/>
+          </a:p>
+        </p:txBody>
+      </p:sp>
+    </p:spTree>
+    <p:extLst>
+      <p:ext uri="{BB962C8B-B14F-4D97-AF65-F5344CB8AC3E}">
+        <p14:creationId xmlns:p14="http://schemas.microsoft.com/office/powerpoint/2010/main" val="2838964745"/>
+      </p:ext>
+    </p:extLst>
+  </p:cSld>
+  <p:clrMapOvr>
+    <a:masterClrMapping/>
+  </p:clrMapOvr>
+</p:notes>
+</file>
+
+<file path=ppt/notesSlides/notesSlide16.xml><?xml version="1.0" encoding="utf-8"?>
+<p:notes xmlns:a="http://schemas.openxmlformats.org/drawingml/2006/main" xmlns:r="http://schemas.openxmlformats.org/officeDocument/2006/relationships" xmlns:p="http://schemas.openxmlformats.org/presentationml/2006/main">
+  <p:cSld>
+    <p:spTree>
+      <p:nvGrpSpPr>
+        <p:cNvPr id="1" name=""/>
+        <p:cNvGrpSpPr/>
+        <p:nvPr/>
+      </p:nvGrpSpPr>
+      <p:grpSpPr>
+        <a:xfrm>
+          <a:off x="0" y="0"/>
+          <a:ext cx="0" cy="0"/>
+          <a:chOff x="0" y="0"/>
+          <a:chExt cx="0" cy="0"/>
+        </a:xfrm>
+      </p:grpSpPr>
+      <p:sp>
+        <p:nvSpPr>
+          <p:cNvPr id="2" name="幻灯片图像占位符 1"/>
+          <p:cNvSpPr>
+            <a:spLocks noGrp="1" noRot="1" noChangeAspect="1"/>
+          </p:cNvSpPr>
+          <p:nvPr>
+            <p:ph type="sldImg"/>
+          </p:nvPr>
+        </p:nvSpPr>
+        <p:spPr/>
+      </p:sp>
+      <p:sp>
+        <p:nvSpPr>
+          <p:cNvPr id="3" name="备注占位符 2"/>
+          <p:cNvSpPr>
+            <a:spLocks noGrp="1"/>
+          </p:cNvSpPr>
+          <p:nvPr>
+            <p:ph type="body" idx="1"/>
+          </p:nvPr>
+        </p:nvSpPr>
+        <p:spPr/>
+        <p:txBody>
+          <a:bodyPr/>
+          <a:lstStyle/>
+          <a:p>
+            <a:endParaRPr lang="zh-CN" altLang="en-US" dirty="0"/>
+          </a:p>
+        </p:txBody>
+      </p:sp>
+      <p:sp>
+        <p:nvSpPr>
+          <p:cNvPr id="4" name="灯片编号占位符 3"/>
+          <p:cNvSpPr>
+            <a:spLocks noGrp="1"/>
+          </p:cNvSpPr>
+          <p:nvPr>
+            <p:ph type="sldNum" sz="quarter" idx="5"/>
+          </p:nvPr>
+        </p:nvSpPr>
+        <p:spPr/>
+        <p:txBody>
+          <a:bodyPr/>
+          <a:lstStyle/>
+          <a:p>
+            <a:fld id="{7421D011-EC35-498F-ADE3-3197FF1A64D5}" type="slidenum">
+              <a:rPr lang="zh-CN" altLang="en-US" smtClean="0"/>
+              <a:t>21</a:t>
+            </a:fld>
+            <a:endParaRPr lang="zh-CN" altLang="en-US"/>
+          </a:p>
+        </p:txBody>
+      </p:sp>
+    </p:spTree>
+    <p:extLst>
+      <p:ext uri="{BB962C8B-B14F-4D97-AF65-F5344CB8AC3E}">
+        <p14:creationId xmlns:p14="http://schemas.microsoft.com/office/powerpoint/2010/main" val="3713233612"/>
+      </p:ext>
+    </p:extLst>
+  </p:cSld>
+  <p:clrMapOvr>
+    <a:masterClrMapping/>
+  </p:clrMapOvr>
+</p:notes>
+</file>
+
+<file path=ppt/notesSlides/notesSlide17.xml><?xml version="1.0" encoding="utf-8"?>
+<p:notes xmlns:a="http://schemas.openxmlformats.org/drawingml/2006/main" xmlns:r="http://schemas.openxmlformats.org/officeDocument/2006/relationships" xmlns:p="http://schemas.openxmlformats.org/presentationml/2006/main">
+  <p:cSld>
+    <p:spTree>
+      <p:nvGrpSpPr>
+        <p:cNvPr id="1" name=""/>
+        <p:cNvGrpSpPr/>
+        <p:nvPr/>
+      </p:nvGrpSpPr>
+      <p:grpSpPr>
+        <a:xfrm>
+          <a:off x="0" y="0"/>
+          <a:ext cx="0" cy="0"/>
+          <a:chOff x="0" y="0"/>
+          <a:chExt cx="0" cy="0"/>
+        </a:xfrm>
+      </p:grpSpPr>
+      <p:sp>
+        <p:nvSpPr>
+          <p:cNvPr id="2" name="幻灯片图像占位符 1"/>
+          <p:cNvSpPr>
+            <a:spLocks noGrp="1" noRot="1" noChangeAspect="1"/>
+          </p:cNvSpPr>
+          <p:nvPr>
+            <p:ph type="sldImg"/>
+          </p:nvPr>
+        </p:nvSpPr>
+        <p:spPr/>
+      </p:sp>
+      <p:sp>
+        <p:nvSpPr>
+          <p:cNvPr id="3" name="备注占位符 2"/>
+          <p:cNvSpPr>
+            <a:spLocks noGrp="1"/>
+          </p:cNvSpPr>
+          <p:nvPr>
+            <p:ph type="body" idx="1"/>
+          </p:nvPr>
+        </p:nvSpPr>
+        <p:spPr/>
+        <p:txBody>
+          <a:bodyPr/>
+          <a:lstStyle/>
+          <a:p>
+            <a:endParaRPr lang="zh-CN" altLang="en-US" dirty="0"/>
+          </a:p>
+        </p:txBody>
+      </p:sp>
+      <p:sp>
+        <p:nvSpPr>
+          <p:cNvPr id="4" name="灯片编号占位符 3"/>
+          <p:cNvSpPr>
+            <a:spLocks noGrp="1"/>
+          </p:cNvSpPr>
+          <p:nvPr>
+            <p:ph type="sldNum" sz="quarter" idx="5"/>
+          </p:nvPr>
+        </p:nvSpPr>
+        <p:spPr/>
+        <p:txBody>
+          <a:bodyPr/>
+          <a:lstStyle/>
+          <a:p>
+            <a:fld id="{7421D011-EC35-498F-ADE3-3197FF1A64D5}" type="slidenum">
+              <a:rPr lang="zh-CN" altLang="en-US" smtClean="0"/>
+              <a:t>22</a:t>
+            </a:fld>
+            <a:endParaRPr lang="zh-CN" altLang="en-US"/>
+          </a:p>
+        </p:txBody>
+      </p:sp>
+    </p:spTree>
+    <p:extLst>
+      <p:ext uri="{BB962C8B-B14F-4D97-AF65-F5344CB8AC3E}">
+        <p14:creationId xmlns:p14="http://schemas.microsoft.com/office/powerpoint/2010/main" val="3652224269"/>
+      </p:ext>
+    </p:extLst>
+  </p:cSld>
+  <p:clrMapOvr>
+    <a:masterClrMapping/>
+  </p:clrMapOvr>
+</p:notes>
+</file>
+
+<file path=ppt/notesSlides/notesSlide18.xml><?xml version="1.0" encoding="utf-8"?>
+<p:notes xmlns:a="http://schemas.openxmlformats.org/drawingml/2006/main" xmlns:r="http://schemas.openxmlformats.org/officeDocument/2006/relationships" xmlns:p="http://schemas.openxmlformats.org/presentationml/2006/main">
+  <p:cSld>
+    <p:spTree>
+      <p:nvGrpSpPr>
+        <p:cNvPr id="1" name=""/>
+        <p:cNvGrpSpPr/>
+        <p:nvPr/>
+      </p:nvGrpSpPr>
+      <p:grpSpPr>
+        <a:xfrm>
+          <a:off x="0" y="0"/>
+          <a:ext cx="0" cy="0"/>
+          <a:chOff x="0" y="0"/>
+          <a:chExt cx="0" cy="0"/>
+        </a:xfrm>
+      </p:grpSpPr>
+      <p:sp>
+        <p:nvSpPr>
+          <p:cNvPr id="2" name="幻灯片图像占位符 1"/>
+          <p:cNvSpPr>
+            <a:spLocks noGrp="1" noRot="1" noChangeAspect="1"/>
+          </p:cNvSpPr>
+          <p:nvPr>
+            <p:ph type="sldImg"/>
+          </p:nvPr>
+        </p:nvSpPr>
+        <p:spPr/>
+      </p:sp>
+      <p:sp>
+        <p:nvSpPr>
+          <p:cNvPr id="3" name="备注占位符 2"/>
+          <p:cNvSpPr>
+            <a:spLocks noGrp="1"/>
+          </p:cNvSpPr>
+          <p:nvPr>
+            <p:ph type="body" idx="1"/>
+          </p:nvPr>
+        </p:nvSpPr>
+        <p:spPr/>
+        <p:txBody>
+          <a:bodyPr/>
+          <a:lstStyle/>
+          <a:p>
+            <a:endParaRPr lang="zh-CN" altLang="en-US" dirty="0"/>
+          </a:p>
+        </p:txBody>
+      </p:sp>
+      <p:sp>
+        <p:nvSpPr>
+          <p:cNvPr id="4" name="灯片编号占位符 3"/>
+          <p:cNvSpPr>
+            <a:spLocks noGrp="1"/>
+          </p:cNvSpPr>
+          <p:nvPr>
+            <p:ph type="sldNum" sz="quarter" idx="5"/>
+          </p:nvPr>
+        </p:nvSpPr>
+        <p:spPr/>
+        <p:txBody>
+          <a:bodyPr/>
+          <a:lstStyle/>
+          <a:p>
+            <a:fld id="{7421D011-EC35-498F-ADE3-3197FF1A64D5}" type="slidenum">
+              <a:rPr lang="zh-CN" altLang="en-US" smtClean="0"/>
+              <a:t>23</a:t>
+            </a:fld>
+            <a:endParaRPr lang="zh-CN" altLang="en-US"/>
+          </a:p>
+        </p:txBody>
+      </p:sp>
+    </p:spTree>
+    <p:extLst>
+      <p:ext uri="{BB962C8B-B14F-4D97-AF65-F5344CB8AC3E}">
+        <p14:creationId xmlns:p14="http://schemas.microsoft.com/office/powerpoint/2010/main" val="2442493587"/>
       </p:ext>
     </p:extLst>
   </p:cSld>
@@ -24239,6 +24580,111 @@
 </p:sld>
 </file>
 
+<file path=ppt/slides/slide19.xml><?xml version="1.0" encoding="utf-8"?>
+<p:sld xmlns:a="http://schemas.openxmlformats.org/drawingml/2006/main" xmlns:r="http://schemas.openxmlformats.org/officeDocument/2006/relationships" xmlns:p="http://schemas.openxmlformats.org/presentationml/2006/main">
+  <p:cSld>
+    <p:spTree>
+      <p:nvGrpSpPr>
+        <p:cNvPr id="1" name=""/>
+        <p:cNvGrpSpPr/>
+        <p:nvPr/>
+      </p:nvGrpSpPr>
+      <p:grpSpPr>
+        <a:xfrm>
+          <a:off x="0" y="0"/>
+          <a:ext cx="0" cy="0"/>
+          <a:chOff x="0" y="0"/>
+          <a:chExt cx="0" cy="0"/>
+        </a:xfrm>
+      </p:grpSpPr>
+      <p:sp>
+        <p:nvSpPr>
+          <p:cNvPr id="10" name="标题 9"/>
+          <p:cNvSpPr>
+            <a:spLocks noGrp="1"/>
+          </p:cNvSpPr>
+          <p:nvPr>
+            <p:ph type="title"/>
+            <p:custDataLst>
+              <p:tags r:id="rId2"/>
+            </p:custDataLst>
+          </p:nvPr>
+        </p:nvSpPr>
+        <p:spPr>
+          <a:xfrm>
+            <a:off x="4186555" y="2959735"/>
+            <a:ext cx="3817620" cy="939165"/>
+          </a:xfrm>
+        </p:spPr>
+        <p:txBody>
+          <a:bodyPr/>
+          <a:lstStyle/>
+          <a:p>
+            <a:pPr algn="ctr"/>
+            <a:r>
+              <a:rPr lang="en-US" altLang="zh-CN"/>
+              <a:t>Pracitce</a:t>
+            </a:r>
+            <a:endParaRPr lang="zh-CN" altLang="en-US" dirty="0"/>
+          </a:p>
+        </p:txBody>
+      </p:sp>
+      <p:sp>
+        <p:nvSpPr>
+          <p:cNvPr id="2" name="文本框 1"/>
+          <p:cNvSpPr txBox="1"/>
+          <p:nvPr>
+            <p:custDataLst>
+              <p:tags r:id="rId3"/>
+            </p:custDataLst>
+          </p:nvPr>
+        </p:nvSpPr>
+        <p:spPr>
+          <a:xfrm>
+            <a:off x="5622290" y="386715"/>
+            <a:ext cx="946150" cy="561975"/>
+          </a:xfrm>
+          <a:prstGeom prst="rect">
+            <a:avLst/>
+          </a:prstGeom>
+          <a:noFill/>
+        </p:spPr>
+        <p:txBody>
+          <a:bodyPr wrap="square" lIns="90000" tIns="46800" rIns="90000" bIns="46800" rtlCol="0">
+            <a:noAutofit/>
+          </a:bodyPr>
+          <a:lstStyle/>
+          <a:p>
+            <a:pPr algn="dist"/>
+            <a:r>
+              <a:rPr lang="en-US" altLang="zh-CN" sz="3000">
+                <a:solidFill>
+                  <a:schemeClr val="bg1"/>
+                </a:solidFill>
+                <a:latin typeface="Arial" panose="020B0604020202020204" pitchFamily="34" charset="0"/>
+                <a:ea typeface="微软雅黑" panose="020B0503020204020204" charset="-122"/>
+              </a:rPr>
+              <a:t>C</a:t>
+            </a:r>
+          </a:p>
+        </p:txBody>
+      </p:sp>
+    </p:spTree>
+    <p:custDataLst>
+      <p:tags r:id="rId1"/>
+    </p:custDataLst>
+    <p:extLst>
+      <p:ext uri="{BB962C8B-B14F-4D97-AF65-F5344CB8AC3E}">
+        <p14:creationId xmlns:p14="http://schemas.microsoft.com/office/powerpoint/2010/main" val="2687129609"/>
+      </p:ext>
+    </p:extLst>
+  </p:cSld>
+  <p:clrMapOvr>
+    <a:masterClrMapping/>
+  </p:clrMapOvr>
+</p:sld>
+</file>
+
 <file path=ppt/slides/slide2.xml><?xml version="1.0" encoding="utf-8"?>
 <p:sld xmlns:a="http://schemas.openxmlformats.org/drawingml/2006/main" xmlns:r="http://schemas.openxmlformats.org/officeDocument/2006/relationships" xmlns:p="http://schemas.openxmlformats.org/presentationml/2006/main">
   <p:cSld>
@@ -24332,6 +24778,903 @@
     <p:custDataLst>
       <p:tags r:id="rId1"/>
     </p:custDataLst>
+  </p:cSld>
+  <p:clrMapOvr>
+    <a:masterClrMapping/>
+  </p:clrMapOvr>
+</p:sld>
+</file>
+
+<file path=ppt/slides/slide20.xml><?xml version="1.0" encoding="utf-8"?>
+<p:sld xmlns:a="http://schemas.openxmlformats.org/drawingml/2006/main" xmlns:r="http://schemas.openxmlformats.org/officeDocument/2006/relationships" xmlns:p="http://schemas.openxmlformats.org/presentationml/2006/main">
+  <p:cSld>
+    <p:spTree>
+      <p:nvGrpSpPr>
+        <p:cNvPr id="1" name=""/>
+        <p:cNvGrpSpPr/>
+        <p:nvPr/>
+      </p:nvGrpSpPr>
+      <p:grpSpPr>
+        <a:xfrm>
+          <a:off x="0" y="0"/>
+          <a:ext cx="0" cy="0"/>
+          <a:chOff x="0" y="0"/>
+          <a:chExt cx="0" cy="0"/>
+        </a:xfrm>
+      </p:grpSpPr>
+      <p:sp>
+        <p:nvSpPr>
+          <p:cNvPr id="5" name="标题 4"/>
+          <p:cNvSpPr>
+            <a:spLocks noGrp="1"/>
+          </p:cNvSpPr>
+          <p:nvPr>
+            <p:ph type="title"/>
+            <p:custDataLst>
+              <p:tags r:id="rId2"/>
+            </p:custDataLst>
+          </p:nvPr>
+        </p:nvSpPr>
+        <p:spPr/>
+        <p:txBody>
+          <a:bodyPr>
+            <a:normAutofit fontScale="90000"/>
+          </a:bodyPr>
+          <a:lstStyle/>
+          <a:p>
+            <a:r>
+              <a:rPr lang="zh-CN" altLang="en-US"/>
+              <a:t>抛硬币</a:t>
+            </a:r>
+          </a:p>
+        </p:txBody>
+      </p:sp>
+      <p:sp>
+        <p:nvSpPr>
+          <p:cNvPr id="2" name="文本占位符 1"/>
+          <p:cNvSpPr>
+            <a:spLocks noGrp="1"/>
+          </p:cNvSpPr>
+          <p:nvPr>
+            <p:ph type="body" sz="quarter" idx="15"/>
+            <p:custDataLst>
+              <p:tags r:id="rId3"/>
+            </p:custDataLst>
+          </p:nvPr>
+        </p:nvSpPr>
+        <p:spPr>
+          <a:xfrm>
+            <a:off x="699770" y="1369695"/>
+            <a:ext cx="5557595" cy="441964"/>
+          </a:xfrm>
+        </p:spPr>
+        <p:txBody>
+          <a:bodyPr>
+            <a:noAutofit/>
+          </a:bodyPr>
+          <a:lstStyle/>
+          <a:p>
+            <a:r>
+              <a:rPr lang="zh-CN" altLang="en-US">
+                <a:latin typeface="+mn-lt"/>
+                <a:cs typeface="+mn-lt"/>
+              </a:rPr>
+              <a:t>使用</a:t>
+            </a:r>
+            <a:r>
+              <a:rPr lang="en-US" altLang="zh-CN">
+                <a:latin typeface="+mn-lt"/>
+                <a:cs typeface="+mn-lt"/>
+              </a:rPr>
+              <a:t>random</a:t>
+            </a:r>
+            <a:r>
+              <a:rPr lang="zh-CN" altLang="en-US">
+                <a:latin typeface="+mn-lt"/>
+                <a:cs typeface="+mn-lt"/>
+              </a:rPr>
+              <a:t>模块，计算抛多次硬币正面朝上的概率。</a:t>
+            </a:r>
+          </a:p>
+        </p:txBody>
+      </p:sp>
+    </p:spTree>
+    <p:custDataLst>
+      <p:tags r:id="rId1"/>
+    </p:custDataLst>
+    <p:extLst>
+      <p:ext uri="{BB962C8B-B14F-4D97-AF65-F5344CB8AC3E}">
+        <p14:creationId xmlns:p14="http://schemas.microsoft.com/office/powerpoint/2010/main" val="1684431155"/>
+      </p:ext>
+    </p:extLst>
+  </p:cSld>
+  <p:clrMapOvr>
+    <a:masterClrMapping/>
+  </p:clrMapOvr>
+</p:sld>
+</file>
+
+<file path=ppt/slides/slide21.xml><?xml version="1.0" encoding="utf-8"?>
+<p:sld xmlns:a="http://schemas.openxmlformats.org/drawingml/2006/main" xmlns:r="http://schemas.openxmlformats.org/officeDocument/2006/relationships" xmlns:p="http://schemas.openxmlformats.org/presentationml/2006/main">
+  <p:cSld>
+    <p:spTree>
+      <p:nvGrpSpPr>
+        <p:cNvPr id="1" name=""/>
+        <p:cNvGrpSpPr/>
+        <p:nvPr/>
+      </p:nvGrpSpPr>
+      <p:grpSpPr>
+        <a:xfrm>
+          <a:off x="0" y="0"/>
+          <a:ext cx="0" cy="0"/>
+          <a:chOff x="0" y="0"/>
+          <a:chExt cx="0" cy="0"/>
+        </a:xfrm>
+      </p:grpSpPr>
+      <p:sp>
+        <p:nvSpPr>
+          <p:cNvPr id="5" name="标题 4"/>
+          <p:cNvSpPr>
+            <a:spLocks noGrp="1"/>
+          </p:cNvSpPr>
+          <p:nvPr>
+            <p:ph type="title"/>
+            <p:custDataLst>
+              <p:tags r:id="rId2"/>
+            </p:custDataLst>
+          </p:nvPr>
+        </p:nvSpPr>
+        <p:spPr/>
+        <p:txBody>
+          <a:bodyPr>
+            <a:normAutofit fontScale="90000"/>
+          </a:bodyPr>
+          <a:lstStyle/>
+          <a:p>
+            <a:r>
+              <a:rPr lang="zh-CN" altLang="en-US"/>
+              <a:t>相隔天数</a:t>
+            </a:r>
+          </a:p>
+        </p:txBody>
+      </p:sp>
+      <p:sp>
+        <p:nvSpPr>
+          <p:cNvPr id="2" name="文本占位符 1"/>
+          <p:cNvSpPr>
+            <a:spLocks noGrp="1"/>
+          </p:cNvSpPr>
+          <p:nvPr>
+            <p:ph type="body" sz="quarter" idx="15"/>
+            <p:custDataLst>
+              <p:tags r:id="rId3"/>
+            </p:custDataLst>
+          </p:nvPr>
+        </p:nvSpPr>
+        <p:spPr>
+          <a:xfrm>
+            <a:off x="699771" y="1369695"/>
+            <a:ext cx="4454936" cy="441964"/>
+          </a:xfrm>
+        </p:spPr>
+        <p:txBody>
+          <a:bodyPr>
+            <a:noAutofit/>
+          </a:bodyPr>
+          <a:lstStyle/>
+          <a:p>
+            <a:r>
+              <a:rPr lang="zh-CN" altLang="en-US">
+                <a:latin typeface="+mn-lt"/>
+                <a:cs typeface="+mn-lt"/>
+              </a:rPr>
+              <a:t>使用</a:t>
+            </a:r>
+            <a:r>
+              <a:rPr lang="en-US" altLang="zh-CN">
+                <a:latin typeface="+mn-lt"/>
+                <a:cs typeface="+mn-lt"/>
+              </a:rPr>
+              <a:t>datetime</a:t>
+            </a:r>
+            <a:r>
+              <a:rPr lang="zh-CN" altLang="en-US">
+                <a:latin typeface="+mn-lt"/>
+                <a:cs typeface="+mn-lt"/>
+              </a:rPr>
+              <a:t>模块，计算两日的相隔天数。</a:t>
+            </a:r>
+          </a:p>
+        </p:txBody>
+      </p:sp>
+      <p:graphicFrame>
+        <p:nvGraphicFramePr>
+          <p:cNvPr id="4" name="表格 3"/>
+          <p:cNvGraphicFramePr/>
+          <p:nvPr>
+            <p:custDataLst>
+              <p:tags r:id="rId4"/>
+            </p:custDataLst>
+            <p:extLst>
+              <p:ext uri="{D42A27DB-BD31-4B8C-83A1-F6EECF244321}">
+                <p14:modId xmlns:p14="http://schemas.microsoft.com/office/powerpoint/2010/main" val="3883704483"/>
+              </p:ext>
+            </p:extLst>
+          </p:nvPr>
+        </p:nvGraphicFramePr>
+        <p:xfrm>
+          <a:off x="699771" y="2349911"/>
+          <a:ext cx="7888419" cy="1463040"/>
+        </p:xfrm>
+        <a:graphic>
+          <a:graphicData uri="http://schemas.openxmlformats.org/drawingml/2006/table">
+            <a:tbl>
+              <a:tblPr firstRow="1" bandRow="1">
+                <a:tableStyleId>{5C22544A-7EE6-4342-B048-85BDC9FD1C3A}</a:tableStyleId>
+              </a:tblPr>
+              <a:tblGrid>
+                <a:gridCol w="7888419">
+                  <a:extLst>
+                    <a:ext uri="{9D8B030D-6E8A-4147-A177-3AD203B41FA5}">
+                      <a16:colId xmlns:a16="http://schemas.microsoft.com/office/drawing/2014/main" val="20000"/>
+                    </a:ext>
+                  </a:extLst>
+                </a:gridCol>
+              </a:tblGrid>
+              <a:tr h="1446904">
+                <a:tc>
+                  <a:txBody>
+                    <a:bodyPr/>
+                    <a:lstStyle/>
+                    <a:p>
+                      <a:pPr>
+                        <a:buNone/>
+                      </a:pPr>
+                      <a:r>
+                        <a:rPr lang="zh-CN" sz="1800" b="1">
+                          <a:solidFill>
+                            <a:schemeClr val="tx1"/>
+                          </a:solidFill>
+                          <a:latin typeface="Consolas" panose="020B0609020204030204" charset="0"/>
+                          <a:cs typeface="Consolas" panose="020B0609020204030204" charset="0"/>
+                          <a:sym typeface="+mn-ea"/>
+                        </a:rPr>
+                        <a:t>测试</a:t>
+                      </a:r>
+                      <a:r>
+                        <a:rPr lang="en-US" altLang="zh-CN" sz="1800" b="1">
+                          <a:solidFill>
+                            <a:schemeClr val="tx1"/>
+                          </a:solidFill>
+                          <a:latin typeface="Consolas" panose="020B0609020204030204" charset="0"/>
+                          <a:cs typeface="Consolas" panose="020B0609020204030204" charset="0"/>
+                          <a:sym typeface="+mn-ea"/>
+                        </a:rPr>
+                        <a:t>1</a:t>
+                      </a:r>
+                    </a:p>
+                    <a:p>
+                      <a:pPr>
+                        <a:buNone/>
+                      </a:pPr>
+                      <a:endParaRPr sz="1800" b="1">
+                        <a:solidFill>
+                          <a:schemeClr val="tx1"/>
+                        </a:solidFill>
+                        <a:latin typeface="Consolas" panose="020B0609020204030204" charset="0"/>
+                        <a:cs typeface="Consolas" panose="020B0609020204030204" charset="0"/>
+                        <a:sym typeface="+mn-ea"/>
+                      </a:endParaRPr>
+                    </a:p>
+                    <a:p>
+                      <a:pPr>
+                        <a:buNone/>
+                      </a:pPr>
+                      <a:r>
+                        <a:rPr lang="en-US" sz="1800" b="0">
+                          <a:solidFill>
+                            <a:schemeClr val="tx1"/>
+                          </a:solidFill>
+                          <a:latin typeface="Consolas" panose="020B0609020204030204" charset="0"/>
+                          <a:cs typeface="Consolas" panose="020B0609020204030204" charset="0"/>
+                          <a:sym typeface="+mn-ea"/>
+                        </a:rPr>
+                        <a:t>Enter the first date: 2022 12 18</a:t>
+                      </a:r>
+                    </a:p>
+                    <a:p>
+                      <a:pPr>
+                        <a:buNone/>
+                      </a:pPr>
+                      <a:r>
+                        <a:rPr lang="en-US" sz="1800" b="0">
+                          <a:solidFill>
+                            <a:schemeClr val="tx1"/>
+                          </a:solidFill>
+                          <a:latin typeface="Consolas" panose="020B0609020204030204" charset="0"/>
+                          <a:cs typeface="Consolas" panose="020B0609020204030204" charset="0"/>
+                          <a:sym typeface="+mn-ea"/>
+                        </a:rPr>
+                        <a:t>Enter the second date: 2023 1 21</a:t>
+                      </a:r>
+                    </a:p>
+                    <a:p>
+                      <a:pPr>
+                        <a:buNone/>
+                      </a:pPr>
+                      <a:r>
+                        <a:rPr lang="en-US" sz="1800" b="0">
+                          <a:solidFill>
+                            <a:schemeClr val="tx1"/>
+                          </a:solidFill>
+                          <a:latin typeface="Consolas" panose="020B0609020204030204" charset="0"/>
+                          <a:cs typeface="Consolas" panose="020B0609020204030204" charset="0"/>
+                          <a:sym typeface="+mn-ea"/>
+                        </a:rPr>
+                        <a:t>The difference between 2022-12-18 and 2023-01-21 is 34 days.</a:t>
+                      </a:r>
+                    </a:p>
+                  </a:txBody>
+                  <a:tcPr>
+                    <a:solidFill>
+                      <a:schemeClr val="accent6">
+                        <a:lumMod val="20000"/>
+                        <a:lumOff val="80000"/>
+                      </a:schemeClr>
+                    </a:solidFill>
+                  </a:tcPr>
+                </a:tc>
+                <a:extLst>
+                  <a:ext uri="{0D108BD9-81ED-4DB2-BD59-A6C34878D82A}">
+                    <a16:rowId xmlns:a16="http://schemas.microsoft.com/office/drawing/2014/main" val="10000"/>
+                  </a:ext>
+                </a:extLst>
+              </a:tr>
+            </a:tbl>
+          </a:graphicData>
+        </a:graphic>
+      </p:graphicFrame>
+      <p:graphicFrame>
+        <p:nvGraphicFramePr>
+          <p:cNvPr id="6" name="表格 5">
+            <a:extLst>
+              <a:ext uri="{FF2B5EF4-FFF2-40B4-BE49-F238E27FC236}">
+                <a16:creationId xmlns:a16="http://schemas.microsoft.com/office/drawing/2014/main" id="{0573EDAC-2B4B-4F1E-066E-C54BCC04A86E}"/>
+              </a:ext>
+            </a:extLst>
+          </p:cNvPr>
+          <p:cNvGraphicFramePr/>
+          <p:nvPr>
+            <p:custDataLst>
+              <p:tags r:id="rId5"/>
+            </p:custDataLst>
+            <p:extLst>
+              <p:ext uri="{D42A27DB-BD31-4B8C-83A1-F6EECF244321}">
+                <p14:modId xmlns:p14="http://schemas.microsoft.com/office/powerpoint/2010/main" val="2072833229"/>
+              </p:ext>
+            </p:extLst>
+          </p:nvPr>
+        </p:nvGraphicFramePr>
+        <p:xfrm>
+          <a:off x="699771" y="4151817"/>
+          <a:ext cx="7888419" cy="1463040"/>
+        </p:xfrm>
+        <a:graphic>
+          <a:graphicData uri="http://schemas.openxmlformats.org/drawingml/2006/table">
+            <a:tbl>
+              <a:tblPr firstRow="1" bandRow="1">
+                <a:tableStyleId>{5C22544A-7EE6-4342-B048-85BDC9FD1C3A}</a:tableStyleId>
+              </a:tblPr>
+              <a:tblGrid>
+                <a:gridCol w="7888419">
+                  <a:extLst>
+                    <a:ext uri="{9D8B030D-6E8A-4147-A177-3AD203B41FA5}">
+                      <a16:colId xmlns:a16="http://schemas.microsoft.com/office/drawing/2014/main" val="20000"/>
+                    </a:ext>
+                  </a:extLst>
+                </a:gridCol>
+              </a:tblGrid>
+              <a:tr h="1446904">
+                <a:tc>
+                  <a:txBody>
+                    <a:bodyPr/>
+                    <a:lstStyle/>
+                    <a:p>
+                      <a:pPr>
+                        <a:buNone/>
+                      </a:pPr>
+                      <a:r>
+                        <a:rPr lang="zh-CN" sz="1800" b="1">
+                          <a:solidFill>
+                            <a:schemeClr val="tx1"/>
+                          </a:solidFill>
+                          <a:latin typeface="Consolas" panose="020B0609020204030204" charset="0"/>
+                          <a:cs typeface="Consolas" panose="020B0609020204030204" charset="0"/>
+                          <a:sym typeface="+mn-ea"/>
+                        </a:rPr>
+                        <a:t>测试</a:t>
+                      </a:r>
+                      <a:r>
+                        <a:rPr lang="en-US" altLang="zh-CN" sz="1800" b="1">
+                          <a:solidFill>
+                            <a:schemeClr val="tx1"/>
+                          </a:solidFill>
+                          <a:latin typeface="Consolas" panose="020B0609020204030204" charset="0"/>
+                          <a:cs typeface="Consolas" panose="020B0609020204030204" charset="0"/>
+                          <a:sym typeface="+mn-ea"/>
+                        </a:rPr>
+                        <a:t>2</a:t>
+                      </a:r>
+                    </a:p>
+                    <a:p>
+                      <a:pPr>
+                        <a:buNone/>
+                      </a:pPr>
+                      <a:endParaRPr sz="1800" b="1">
+                        <a:solidFill>
+                          <a:schemeClr val="tx1"/>
+                        </a:solidFill>
+                        <a:latin typeface="Consolas" panose="020B0609020204030204" charset="0"/>
+                        <a:cs typeface="Consolas" panose="020B0609020204030204" charset="0"/>
+                        <a:sym typeface="+mn-ea"/>
+                      </a:endParaRPr>
+                    </a:p>
+                    <a:p>
+                      <a:pPr>
+                        <a:buNone/>
+                      </a:pPr>
+                      <a:r>
+                        <a:rPr lang="en-US" sz="1800" b="0">
+                          <a:solidFill>
+                            <a:schemeClr val="tx1"/>
+                          </a:solidFill>
+                          <a:latin typeface="Consolas" panose="020B0609020204030204" charset="0"/>
+                          <a:cs typeface="Consolas" panose="020B0609020204030204" charset="0"/>
+                          <a:sym typeface="+mn-ea"/>
+                        </a:rPr>
+                        <a:t>Enter the first date: 2023 1 8</a:t>
+                      </a:r>
+                    </a:p>
+                    <a:p>
+                      <a:pPr>
+                        <a:buNone/>
+                      </a:pPr>
+                      <a:r>
+                        <a:rPr lang="en-US" sz="1800" b="0">
+                          <a:solidFill>
+                            <a:schemeClr val="tx1"/>
+                          </a:solidFill>
+                          <a:latin typeface="Consolas" panose="020B0609020204030204" charset="0"/>
+                          <a:cs typeface="Consolas" panose="020B0609020204030204" charset="0"/>
+                          <a:sym typeface="+mn-ea"/>
+                        </a:rPr>
+                        <a:t>Enter the second date: 2023 1 21</a:t>
+                      </a:r>
+                    </a:p>
+                    <a:p>
+                      <a:pPr>
+                        <a:buNone/>
+                      </a:pPr>
+                      <a:r>
+                        <a:rPr lang="en-US" sz="1800" b="0">
+                          <a:solidFill>
+                            <a:schemeClr val="tx1"/>
+                          </a:solidFill>
+                          <a:latin typeface="Consolas" panose="020B0609020204030204" charset="0"/>
+                          <a:cs typeface="Consolas" panose="020B0609020204030204" charset="0"/>
+                          <a:sym typeface="+mn-ea"/>
+                        </a:rPr>
+                        <a:t>The difference between 2023-01-08 and 2023-01-21 is 13 days.</a:t>
+                      </a:r>
+                    </a:p>
+                  </a:txBody>
+                  <a:tcPr>
+                    <a:solidFill>
+                      <a:schemeClr val="accent6">
+                        <a:lumMod val="20000"/>
+                        <a:lumOff val="80000"/>
+                      </a:schemeClr>
+                    </a:solidFill>
+                  </a:tcPr>
+                </a:tc>
+                <a:extLst>
+                  <a:ext uri="{0D108BD9-81ED-4DB2-BD59-A6C34878D82A}">
+                    <a16:rowId xmlns:a16="http://schemas.microsoft.com/office/drawing/2014/main" val="10000"/>
+                  </a:ext>
+                </a:extLst>
+              </a:tr>
+            </a:tbl>
+          </a:graphicData>
+        </a:graphic>
+      </p:graphicFrame>
+    </p:spTree>
+    <p:custDataLst>
+      <p:tags r:id="rId1"/>
+    </p:custDataLst>
+    <p:extLst>
+      <p:ext uri="{BB962C8B-B14F-4D97-AF65-F5344CB8AC3E}">
+        <p14:creationId xmlns:p14="http://schemas.microsoft.com/office/powerpoint/2010/main" val="3387789993"/>
+      </p:ext>
+    </p:extLst>
+  </p:cSld>
+  <p:clrMapOvr>
+    <a:masterClrMapping/>
+  </p:clrMapOvr>
+</p:sld>
+</file>
+
+<file path=ppt/slides/slide22.xml><?xml version="1.0" encoding="utf-8"?>
+<p:sld xmlns:a="http://schemas.openxmlformats.org/drawingml/2006/main" xmlns:r="http://schemas.openxmlformats.org/officeDocument/2006/relationships" xmlns:p="http://schemas.openxmlformats.org/presentationml/2006/main">
+  <p:cSld>
+    <p:spTree>
+      <p:nvGrpSpPr>
+        <p:cNvPr id="1" name=""/>
+        <p:cNvGrpSpPr/>
+        <p:nvPr/>
+      </p:nvGrpSpPr>
+      <p:grpSpPr>
+        <a:xfrm>
+          <a:off x="0" y="0"/>
+          <a:ext cx="0" cy="0"/>
+          <a:chOff x="0" y="0"/>
+          <a:chExt cx="0" cy="0"/>
+        </a:xfrm>
+      </p:grpSpPr>
+      <p:sp>
+        <p:nvSpPr>
+          <p:cNvPr id="5" name="标题 4"/>
+          <p:cNvSpPr>
+            <a:spLocks noGrp="1"/>
+          </p:cNvSpPr>
+          <p:nvPr>
+            <p:ph type="title"/>
+            <p:custDataLst>
+              <p:tags r:id="rId2"/>
+            </p:custDataLst>
+          </p:nvPr>
+        </p:nvSpPr>
+        <p:spPr/>
+        <p:txBody>
+          <a:bodyPr>
+            <a:normAutofit fontScale="90000"/>
+          </a:bodyPr>
+          <a:lstStyle/>
+          <a:p>
+            <a:r>
+              <a:rPr lang="en-US" altLang="zh-CN"/>
+              <a:t>logo</a:t>
+            </a:r>
+            <a:endParaRPr lang="zh-CN" altLang="en-US"/>
+          </a:p>
+        </p:txBody>
+      </p:sp>
+      <p:sp>
+        <p:nvSpPr>
+          <p:cNvPr id="2" name="文本占位符 1"/>
+          <p:cNvSpPr>
+            <a:spLocks noGrp="1"/>
+          </p:cNvSpPr>
+          <p:nvPr>
+            <p:ph type="body" sz="quarter" idx="15"/>
+            <p:custDataLst>
+              <p:tags r:id="rId3"/>
+            </p:custDataLst>
+          </p:nvPr>
+        </p:nvSpPr>
+        <p:spPr>
+          <a:xfrm>
+            <a:off x="699771" y="1369695"/>
+            <a:ext cx="4454936" cy="441964"/>
+          </a:xfrm>
+        </p:spPr>
+        <p:txBody>
+          <a:bodyPr>
+            <a:noAutofit/>
+          </a:bodyPr>
+          <a:lstStyle/>
+          <a:p>
+            <a:r>
+              <a:rPr lang="zh-CN" altLang="en-US">
+                <a:latin typeface="+mn-lt"/>
+                <a:cs typeface="+mn-lt"/>
+              </a:rPr>
+              <a:t>使用</a:t>
+            </a:r>
+            <a:r>
+              <a:rPr lang="en-US" altLang="zh-CN">
+                <a:latin typeface="+mn-lt"/>
+                <a:cs typeface="+mn-lt"/>
+              </a:rPr>
+              <a:t>turtle</a:t>
+            </a:r>
+            <a:r>
+              <a:rPr lang="zh-CN" altLang="en-US">
+                <a:latin typeface="+mn-lt"/>
+                <a:cs typeface="+mn-lt"/>
+              </a:rPr>
+              <a:t>模块，绘制</a:t>
+            </a:r>
+            <a:r>
+              <a:rPr lang="en-US" altLang="zh-CN">
+                <a:latin typeface="+mn-lt"/>
+                <a:cs typeface="+mn-lt"/>
+              </a:rPr>
+              <a:t>logo</a:t>
+            </a:r>
+            <a:r>
+              <a:rPr lang="zh-CN" altLang="en-US">
+                <a:latin typeface="+mn-lt"/>
+                <a:cs typeface="+mn-lt"/>
+              </a:rPr>
+              <a:t>。</a:t>
+            </a:r>
+          </a:p>
+        </p:txBody>
+      </p:sp>
+      <p:pic>
+        <p:nvPicPr>
+          <p:cNvPr id="7" name="图片 6">
+            <a:extLst>
+              <a:ext uri="{FF2B5EF4-FFF2-40B4-BE49-F238E27FC236}">
+                <a16:creationId xmlns:a16="http://schemas.microsoft.com/office/drawing/2014/main" id="{BB8B6688-06BA-D4FA-2CED-F9847BB88095}"/>
+              </a:ext>
+            </a:extLst>
+          </p:cNvPr>
+          <p:cNvPicPr>
+            <a:picLocks noChangeAspect="1"/>
+          </p:cNvPicPr>
+          <p:nvPr/>
+        </p:nvPicPr>
+        <p:blipFill>
+          <a:blip r:embed="rId6"/>
+          <a:stretch>
+            <a:fillRect/>
+          </a:stretch>
+        </p:blipFill>
+        <p:spPr>
+          <a:xfrm>
+            <a:off x="699771" y="2501790"/>
+            <a:ext cx="3905019" cy="3254183"/>
+          </a:xfrm>
+          <a:prstGeom prst="rect">
+            <a:avLst/>
+          </a:prstGeom>
+        </p:spPr>
+      </p:pic>
+    </p:spTree>
+    <p:custDataLst>
+      <p:tags r:id="rId1"/>
+    </p:custDataLst>
+    <p:extLst>
+      <p:ext uri="{BB962C8B-B14F-4D97-AF65-F5344CB8AC3E}">
+        <p14:creationId xmlns:p14="http://schemas.microsoft.com/office/powerpoint/2010/main" val="3465790611"/>
+      </p:ext>
+    </p:extLst>
+  </p:cSld>
+  <p:clrMapOvr>
+    <a:masterClrMapping/>
+  </p:clrMapOvr>
+</p:sld>
+</file>
+
+<file path=ppt/slides/slide23.xml><?xml version="1.0" encoding="utf-8"?>
+<p:sld xmlns:a="http://schemas.openxmlformats.org/drawingml/2006/main" xmlns:r="http://schemas.openxmlformats.org/officeDocument/2006/relationships" xmlns:p="http://schemas.openxmlformats.org/presentationml/2006/main">
+  <p:cSld>
+    <p:spTree>
+      <p:nvGrpSpPr>
+        <p:cNvPr id="1" name=""/>
+        <p:cNvGrpSpPr/>
+        <p:nvPr/>
+      </p:nvGrpSpPr>
+      <p:grpSpPr>
+        <a:xfrm>
+          <a:off x="0" y="0"/>
+          <a:ext cx="0" cy="0"/>
+          <a:chOff x="0" y="0"/>
+          <a:chExt cx="0" cy="0"/>
+        </a:xfrm>
+      </p:grpSpPr>
+      <p:sp>
+        <p:nvSpPr>
+          <p:cNvPr id="5" name="标题 4"/>
+          <p:cNvSpPr>
+            <a:spLocks noGrp="1"/>
+          </p:cNvSpPr>
+          <p:nvPr>
+            <p:ph type="title"/>
+            <p:custDataLst>
+              <p:tags r:id="rId2"/>
+            </p:custDataLst>
+          </p:nvPr>
+        </p:nvSpPr>
+        <p:spPr/>
+        <p:txBody>
+          <a:bodyPr>
+            <a:normAutofit fontScale="90000"/>
+          </a:bodyPr>
+          <a:lstStyle/>
+          <a:p>
+            <a:r>
+              <a:rPr lang="zh-CN" altLang="en-US"/>
+              <a:t>图像处理</a:t>
+            </a:r>
+          </a:p>
+        </p:txBody>
+      </p:sp>
+      <p:sp>
+        <p:nvSpPr>
+          <p:cNvPr id="2" name="文本占位符 1"/>
+          <p:cNvSpPr>
+            <a:spLocks noGrp="1"/>
+          </p:cNvSpPr>
+          <p:nvPr>
+            <p:ph type="body" sz="quarter" idx="15"/>
+            <p:custDataLst>
+              <p:tags r:id="rId3"/>
+            </p:custDataLst>
+          </p:nvPr>
+        </p:nvSpPr>
+        <p:spPr>
+          <a:xfrm>
+            <a:off x="699771" y="1140647"/>
+            <a:ext cx="4885242" cy="441964"/>
+          </a:xfrm>
+        </p:spPr>
+        <p:txBody>
+          <a:bodyPr>
+            <a:noAutofit/>
+          </a:bodyPr>
+          <a:lstStyle/>
+          <a:p>
+            <a:r>
+              <a:rPr lang="zh-CN" altLang="en-US">
+                <a:latin typeface="+mn-lt"/>
+                <a:cs typeface="+mn-lt"/>
+              </a:rPr>
+              <a:t>使用</a:t>
+            </a:r>
+            <a:r>
+              <a:rPr lang="en-US" altLang="zh-CN">
+                <a:latin typeface="+mn-lt"/>
+                <a:cs typeface="+mn-lt"/>
+              </a:rPr>
+              <a:t>imageio</a:t>
+            </a:r>
+            <a:r>
+              <a:rPr lang="zh-CN" altLang="en-US">
+                <a:latin typeface="+mn-lt"/>
+                <a:cs typeface="+mn-lt"/>
+              </a:rPr>
+              <a:t>和</a:t>
+            </a:r>
+            <a:r>
+              <a:rPr lang="en-US" altLang="zh-CN">
+                <a:latin typeface="+mn-lt"/>
+                <a:cs typeface="+mn-lt"/>
+              </a:rPr>
+              <a:t>matplotlib</a:t>
+            </a:r>
+            <a:r>
+              <a:rPr lang="zh-CN" altLang="en-US">
+                <a:latin typeface="+mn-lt"/>
+                <a:cs typeface="+mn-lt"/>
+              </a:rPr>
+              <a:t>模块，合并两张图片。</a:t>
+            </a:r>
+          </a:p>
+        </p:txBody>
+      </p:sp>
+      <p:pic>
+        <p:nvPicPr>
+          <p:cNvPr id="8" name="图片 7">
+            <a:extLst>
+              <a:ext uri="{FF2B5EF4-FFF2-40B4-BE49-F238E27FC236}">
+                <a16:creationId xmlns:a16="http://schemas.microsoft.com/office/drawing/2014/main" id="{BB62658D-7CFA-3CEB-25ED-751B93F6EDAB}"/>
+              </a:ext>
+            </a:extLst>
+          </p:cNvPr>
+          <p:cNvPicPr>
+            <a:picLocks noChangeAspect="1"/>
+          </p:cNvPicPr>
+          <p:nvPr/>
+        </p:nvPicPr>
+        <p:blipFill>
+          <a:blip r:embed="rId6" cstate="print">
+            <a:extLst>
+              <a:ext uri="{28A0092B-C50C-407E-A947-70E740481C1C}">
+                <a14:useLocalDpi xmlns:a14="http://schemas.microsoft.com/office/drawing/2010/main" val="0"/>
+              </a:ext>
+            </a:extLst>
+          </a:blip>
+          <a:stretch>
+            <a:fillRect/>
+          </a:stretch>
+        </p:blipFill>
+        <p:spPr>
+          <a:xfrm>
+            <a:off x="2070288" y="1802786"/>
+            <a:ext cx="3514725" cy="1967312"/>
+          </a:xfrm>
+          <a:prstGeom prst="rect">
+            <a:avLst/>
+          </a:prstGeom>
+        </p:spPr>
+      </p:pic>
+      <p:pic>
+        <p:nvPicPr>
+          <p:cNvPr id="10" name="图片 9">
+            <a:extLst>
+              <a:ext uri="{FF2B5EF4-FFF2-40B4-BE49-F238E27FC236}">
+                <a16:creationId xmlns:a16="http://schemas.microsoft.com/office/drawing/2014/main" id="{DEC0D36D-0415-086B-84B3-F99D5FAFEB32}"/>
+              </a:ext>
+            </a:extLst>
+          </p:cNvPr>
+          <p:cNvPicPr>
+            <a:picLocks noChangeAspect="1"/>
+          </p:cNvPicPr>
+          <p:nvPr/>
+        </p:nvPicPr>
+        <p:blipFill>
+          <a:blip r:embed="rId7" cstate="print">
+            <a:extLst>
+              <a:ext uri="{28A0092B-C50C-407E-A947-70E740481C1C}">
+                <a14:useLocalDpi xmlns:a14="http://schemas.microsoft.com/office/drawing/2010/main" val="0"/>
+              </a:ext>
+            </a:extLst>
+          </a:blip>
+          <a:stretch>
+            <a:fillRect/>
+          </a:stretch>
+        </p:blipFill>
+        <p:spPr>
+          <a:xfrm>
+            <a:off x="6893858" y="1802786"/>
+            <a:ext cx="3738284" cy="1962599"/>
+          </a:xfrm>
+          <a:prstGeom prst="rect">
+            <a:avLst/>
+          </a:prstGeom>
+        </p:spPr>
+      </p:pic>
+      <p:pic>
+        <p:nvPicPr>
+          <p:cNvPr id="12" name="图片 11">
+            <a:extLst>
+              <a:ext uri="{FF2B5EF4-FFF2-40B4-BE49-F238E27FC236}">
+                <a16:creationId xmlns:a16="http://schemas.microsoft.com/office/drawing/2014/main" id="{8FA0C118-FF17-D46D-736E-33C4797C475C}"/>
+              </a:ext>
+            </a:extLst>
+          </p:cNvPr>
+          <p:cNvPicPr>
+            <a:picLocks noChangeAspect="1"/>
+          </p:cNvPicPr>
+          <p:nvPr/>
+        </p:nvPicPr>
+        <p:blipFill>
+          <a:blip r:embed="rId8"/>
+          <a:stretch>
+            <a:fillRect/>
+          </a:stretch>
+        </p:blipFill>
+        <p:spPr>
+          <a:xfrm>
+            <a:off x="3993504" y="4105835"/>
+            <a:ext cx="4204992" cy="2353201"/>
+          </a:xfrm>
+          <a:prstGeom prst="rect">
+            <a:avLst/>
+          </a:prstGeom>
+        </p:spPr>
+      </p:pic>
+    </p:spTree>
+    <p:custDataLst>
+      <p:tags r:id="rId1"/>
+    </p:custDataLst>
+    <p:extLst>
+      <p:ext uri="{BB962C8B-B14F-4D97-AF65-F5344CB8AC3E}">
+        <p14:creationId xmlns:p14="http://schemas.microsoft.com/office/powerpoint/2010/main" val="3888177360"/>
+      </p:ext>
+    </p:extLst>
   </p:cSld>
   <p:clrMapOvr>
     <a:masterClrMapping/>
@@ -35318,6 +36661,180 @@
 </p:tagLst>
 </file>
 
+<file path=ppt/tags/tag282.xml><?xml version="1.0" encoding="utf-8"?>
+<p:tagLst xmlns:a="http://schemas.openxmlformats.org/drawingml/2006/main" xmlns:r="http://schemas.openxmlformats.org/officeDocument/2006/relationships" xmlns:p="http://schemas.openxmlformats.org/presentationml/2006/main">
+  <p:tag name="KSO_WM_SLIDE_ID" val="custom20202582_7"/>
+  <p:tag name="KSO_WM_TEMPLATE_SUBCATEGORY" val="0"/>
+  <p:tag name="KSO_WM_TEMPLATE_MASTER_TYPE" val="1"/>
+  <p:tag name="KSO_WM_TEMPLATE_COLOR_TYPE" val="1"/>
+  <p:tag name="KSO_WM_SLIDE_TYPE" val="sectionTitle"/>
+  <p:tag name="KSO_WM_SLIDE_SUBTYPE" val="pureTxt"/>
+  <p:tag name="KSO_WM_SLIDE_ITEM_CNT" val="0"/>
+  <p:tag name="KSO_WM_SLIDE_INDEX" val="7"/>
+  <p:tag name="KSO_WM_TAG_VERSION" val="1.0"/>
+  <p:tag name="KSO_WM_BEAUTIFY_FLAG" val="#wm#"/>
+  <p:tag name="KSO_WM_TEMPLATE_CATEGORY" val="custom"/>
+  <p:tag name="KSO_WM_TEMPLATE_INDEX" val="20202582"/>
+  <p:tag name="KSO_WM_SLIDE_LAYOUT" val="a_b_e_j"/>
+  <p:tag name="KSO_WM_SLIDE_LAYOUT_CNT" val="1_1_1_1"/>
+</p:tagLst>
+</file>
+
+<file path=ppt/tags/tag283.xml><?xml version="1.0" encoding="utf-8"?>
+<p:tagLst xmlns:a="http://schemas.openxmlformats.org/drawingml/2006/main" xmlns:r="http://schemas.openxmlformats.org/officeDocument/2006/relationships" xmlns:p="http://schemas.openxmlformats.org/presentationml/2006/main">
+  <p:tag name="KSO_WM_UNIT_ISCONTENTSTITLE" val="0"/>
+  <p:tag name="KSO_WM_UNIT_PRESET_TEXT" val="单击此处添加标题"/>
+  <p:tag name="KSO_WM_UNIT_NOCLEAR" val="0"/>
+  <p:tag name="KSO_WM_UNIT_VALUE" val="9"/>
+  <p:tag name="KSO_WM_UNIT_HIGHLIGHT" val="0"/>
+  <p:tag name="KSO_WM_UNIT_COMPATIBLE" val="0"/>
+  <p:tag name="KSO_WM_UNIT_DIAGRAM_ISNUMVISUAL" val="0"/>
+  <p:tag name="KSO_WM_UNIT_DIAGRAM_ISREFERUNIT" val="0"/>
+  <p:tag name="KSO_WM_UNIT_TYPE" val="a"/>
+  <p:tag name="KSO_WM_UNIT_INDEX" val="1"/>
+  <p:tag name="KSO_WM_UNIT_ID" val="custom20202582_7*a*1"/>
+  <p:tag name="KSO_WM_TEMPLATE_CATEGORY" val="custom"/>
+  <p:tag name="KSO_WM_TEMPLATE_INDEX" val="20202582"/>
+  <p:tag name="KSO_WM_UNIT_LAYERLEVEL" val="1"/>
+  <p:tag name="KSO_WM_TAG_VERSION" val="1.0"/>
+  <p:tag name="KSO_WM_BEAUTIFY_FLAG" val="#wm#"/>
+  <p:tag name="KSO_WM_UNIT_ISNUMDGMTITLE" val="0"/>
+</p:tagLst>
+</file>
+
+<file path=ppt/tags/tag284.xml><?xml version="1.0" encoding="utf-8"?>
+<p:tagLst xmlns:a="http://schemas.openxmlformats.org/drawingml/2006/main" xmlns:r="http://schemas.openxmlformats.org/officeDocument/2006/relationships" xmlns:p="http://schemas.openxmlformats.org/presentationml/2006/main">
+  <p:tag name="KSO_WM_UNIT_ISCONTENTSTITLE" val="0"/>
+  <p:tag name="KSO_WM_UNIT_PRESET_TEXT" val="Contents"/>
+  <p:tag name="KSO_WM_UNIT_NOCLEAR" val="0"/>
+  <p:tag name="KSO_WM_UNIT_VALUE" val="7"/>
+  <p:tag name="KSO_WM_UNIT_HIGHLIGHT" val="0"/>
+  <p:tag name="KSO_WM_UNIT_COMPATIBLE" val="0"/>
+  <p:tag name="KSO_WM_UNIT_DIAGRAM_ISNUMVISUAL" val="0"/>
+  <p:tag name="KSO_WM_UNIT_DIAGRAM_ISREFERUNIT" val="0"/>
+  <p:tag name="KSO_WM_DIAGRAM_GROUP_CODE" val="l1-1"/>
+  <p:tag name="KSO_WM_UNIT_TYPE" val="b"/>
+  <p:tag name="KSO_WM_UNIT_INDEX" val="1"/>
+  <p:tag name="KSO_WM_UNIT_ID" val="custom20202582_3*b*1"/>
+  <p:tag name="KSO_WM_TEMPLATE_CATEGORY" val="custom"/>
+  <p:tag name="KSO_WM_TEMPLATE_INDEX" val="20202582"/>
+  <p:tag name="KSO_WM_UNIT_LAYERLEVEL" val="1"/>
+  <p:tag name="KSO_WM_TAG_VERSION" val="1.0"/>
+  <p:tag name="KSO_WM_BEAUTIFY_FLAG" val="#wm#"/>
+  <p:tag name="KSO_WM_UNIT_ISNUMDGMTITLE" val="0"/>
+  <p:tag name="KSO_WM_UNIT_TEXT_FILL_FORE_SCHEMECOLOR_INDEX" val="13"/>
+  <p:tag name="KSO_WM_UNIT_TEXT_FILL_TYPE" val="1"/>
+  <p:tag name="KSO_WM_UNIT_USESOURCEFORMAT_APPLY" val="1"/>
+</p:tagLst>
+</file>
+
+<file path=ppt/tags/tag285.xml><?xml version="1.0" encoding="utf-8"?>
+<p:tagLst xmlns:a="http://schemas.openxmlformats.org/drawingml/2006/main" xmlns:r="http://schemas.openxmlformats.org/officeDocument/2006/relationships" xmlns:p="http://schemas.openxmlformats.org/presentationml/2006/main">
+  <p:tag name="KSO_WM_SLIDE_ID" val="custom20202582_13"/>
+  <p:tag name="KSO_WM_TEMPLATE_SUBCATEGORY" val="0"/>
+  <p:tag name="KSO_WM_TEMPLATE_MASTER_TYPE" val="1"/>
+  <p:tag name="KSO_WM_TEMPLATE_COLOR_TYPE" val="1"/>
+  <p:tag name="KSO_WM_SLIDE_TYPE" val="text"/>
+  <p:tag name="KSO_WM_SLIDE_SUBTYPE" val="picTxt"/>
+  <p:tag name="KSO_WM_SLIDE_ITEM_CNT" val="0"/>
+  <p:tag name="KSO_WM_SLIDE_INDEX" val="13"/>
+  <p:tag name="KSO_WM_SLIDE_SIZE" val="869*422"/>
+  <p:tag name="KSO_WM_SLIDE_POSITION" val="45*18"/>
+  <p:tag name="KSO_WM_TAG_VERSION" val="1.0"/>
+  <p:tag name="KSO_WM_BEAUTIFY_FLAG" val="#wm#"/>
+  <p:tag name="KSO_WM_TEMPLATE_CATEGORY" val="custom"/>
+  <p:tag name="KSO_WM_TEMPLATE_INDEX" val="20202582"/>
+  <p:tag name="KSO_WM_SLIDE_LAYOUT" val="a_d_f"/>
+  <p:tag name="KSO_WM_SLIDE_LAYOUT_CNT" val="1_2_2"/>
+</p:tagLst>
+</file>
+
+<file path=ppt/tags/tag286.xml><?xml version="1.0" encoding="utf-8"?>
+<p:tagLst xmlns:a="http://schemas.openxmlformats.org/drawingml/2006/main" xmlns:r="http://schemas.openxmlformats.org/officeDocument/2006/relationships" xmlns:p="http://schemas.openxmlformats.org/presentationml/2006/main">
+  <p:tag name="KSO_WM_UNIT_ISCONTENTSTITLE" val="0"/>
+  <p:tag name="KSO_WM_UNIT_PRESET_TEXT" val="单击此处添加标题"/>
+  <p:tag name="KSO_WM_UNIT_NOCLEAR" val="0"/>
+  <p:tag name="KSO_WM_UNIT_VALUE" val="42"/>
+  <p:tag name="KSO_WM_UNIT_HIGHLIGHT" val="0"/>
+  <p:tag name="KSO_WM_UNIT_COMPATIBLE" val="0"/>
+  <p:tag name="KSO_WM_UNIT_DIAGRAM_ISNUMVISUAL" val="0"/>
+  <p:tag name="KSO_WM_UNIT_DIAGRAM_ISREFERUNIT" val="0"/>
+  <p:tag name="KSO_WM_UNIT_TYPE" val="a"/>
+  <p:tag name="KSO_WM_UNIT_INDEX" val="1"/>
+  <p:tag name="KSO_WM_UNIT_ID" val="custom20202582_13*a*1"/>
+  <p:tag name="KSO_WM_TEMPLATE_CATEGORY" val="custom"/>
+  <p:tag name="KSO_WM_TEMPLATE_INDEX" val="20202582"/>
+  <p:tag name="KSO_WM_UNIT_LAYERLEVEL" val="1"/>
+  <p:tag name="KSO_WM_TAG_VERSION" val="1.0"/>
+  <p:tag name="KSO_WM_BEAUTIFY_FLAG" val="#wm#"/>
+  <p:tag name="KSO_WM_UNIT_ISNUMDGMTITLE" val="0"/>
+</p:tagLst>
+</file>
+
+<file path=ppt/tags/tag287.xml><?xml version="1.0" encoding="utf-8"?>
+<p:tagLst xmlns:a="http://schemas.openxmlformats.org/drawingml/2006/main" xmlns:r="http://schemas.openxmlformats.org/officeDocument/2006/relationships" xmlns:p="http://schemas.openxmlformats.org/presentationml/2006/main">
+  <p:tag name="KSO_WM_UNIT_PRESET_TEXT" val="单击此处添加文本具体内容，简明扼要的阐述您的观点。"/>
+  <p:tag name="KSO_WM_UNIT_NOCLEAR" val="0"/>
+  <p:tag name="KSO_WM_UNIT_VALUE" val="50"/>
+  <p:tag name="KSO_WM_UNIT_HIGHLIGHT" val="0"/>
+  <p:tag name="KSO_WM_UNIT_COMPATIBLE" val="0"/>
+  <p:tag name="KSO_WM_UNIT_DIAGRAM_ISNUMVISUAL" val="0"/>
+  <p:tag name="KSO_WM_UNIT_DIAGRAM_ISREFERUNIT" val="0"/>
+  <p:tag name="KSO_WM_UNIT_TYPE" val="f"/>
+  <p:tag name="KSO_WM_UNIT_INDEX" val="2"/>
+  <p:tag name="KSO_WM_UNIT_ID" val="custom20202582_13*f*2"/>
+  <p:tag name="KSO_WM_TEMPLATE_CATEGORY" val="custom"/>
+  <p:tag name="KSO_WM_TEMPLATE_INDEX" val="20202582"/>
+  <p:tag name="KSO_WM_UNIT_LAYERLEVEL" val="1"/>
+  <p:tag name="KSO_WM_TAG_VERSION" val="1.0"/>
+  <p:tag name="KSO_WM_BEAUTIFY_FLAG" val="#wm#"/>
+  <p:tag name="KSO_WM_UNIT_SUBTYPE" val="a"/>
+</p:tagLst>
+</file>
+
+<file path=ppt/tags/tag288.xml><?xml version="1.0" encoding="utf-8"?>
+<p:tagLst xmlns:a="http://schemas.openxmlformats.org/drawingml/2006/main" xmlns:r="http://schemas.openxmlformats.org/officeDocument/2006/relationships" xmlns:p="http://schemas.openxmlformats.org/presentationml/2006/main">
+  <p:tag name="KSO_WM_SLIDE_ID" val="custom20202582_13"/>
+  <p:tag name="KSO_WM_TEMPLATE_SUBCATEGORY" val="0"/>
+  <p:tag name="KSO_WM_TEMPLATE_MASTER_TYPE" val="1"/>
+  <p:tag name="KSO_WM_TEMPLATE_COLOR_TYPE" val="1"/>
+  <p:tag name="KSO_WM_SLIDE_TYPE" val="text"/>
+  <p:tag name="KSO_WM_SLIDE_SUBTYPE" val="picTxt"/>
+  <p:tag name="KSO_WM_SLIDE_ITEM_CNT" val="0"/>
+  <p:tag name="KSO_WM_SLIDE_INDEX" val="13"/>
+  <p:tag name="KSO_WM_SLIDE_SIZE" val="869*422"/>
+  <p:tag name="KSO_WM_SLIDE_POSITION" val="45*18"/>
+  <p:tag name="KSO_WM_TAG_VERSION" val="1.0"/>
+  <p:tag name="KSO_WM_BEAUTIFY_FLAG" val="#wm#"/>
+  <p:tag name="KSO_WM_TEMPLATE_CATEGORY" val="custom"/>
+  <p:tag name="KSO_WM_TEMPLATE_INDEX" val="20202582"/>
+  <p:tag name="KSO_WM_SLIDE_LAYOUT" val="a_d_f"/>
+  <p:tag name="KSO_WM_SLIDE_LAYOUT_CNT" val="1_2_2"/>
+</p:tagLst>
+</file>
+
+<file path=ppt/tags/tag289.xml><?xml version="1.0" encoding="utf-8"?>
+<p:tagLst xmlns:a="http://schemas.openxmlformats.org/drawingml/2006/main" xmlns:r="http://schemas.openxmlformats.org/officeDocument/2006/relationships" xmlns:p="http://schemas.openxmlformats.org/presentationml/2006/main">
+  <p:tag name="KSO_WM_UNIT_ISCONTENTSTITLE" val="0"/>
+  <p:tag name="KSO_WM_UNIT_PRESET_TEXT" val="单击此处添加标题"/>
+  <p:tag name="KSO_WM_UNIT_NOCLEAR" val="0"/>
+  <p:tag name="KSO_WM_UNIT_VALUE" val="42"/>
+  <p:tag name="KSO_WM_UNIT_HIGHLIGHT" val="0"/>
+  <p:tag name="KSO_WM_UNIT_COMPATIBLE" val="0"/>
+  <p:tag name="KSO_WM_UNIT_DIAGRAM_ISNUMVISUAL" val="0"/>
+  <p:tag name="KSO_WM_UNIT_DIAGRAM_ISREFERUNIT" val="0"/>
+  <p:tag name="KSO_WM_UNIT_TYPE" val="a"/>
+  <p:tag name="KSO_WM_UNIT_INDEX" val="1"/>
+  <p:tag name="KSO_WM_UNIT_ID" val="custom20202582_13*a*1"/>
+  <p:tag name="KSO_WM_TEMPLATE_CATEGORY" val="custom"/>
+  <p:tag name="KSO_WM_TEMPLATE_INDEX" val="20202582"/>
+  <p:tag name="KSO_WM_UNIT_LAYERLEVEL" val="1"/>
+  <p:tag name="KSO_WM_TAG_VERSION" val="1.0"/>
+  <p:tag name="KSO_WM_BEAUTIFY_FLAG" val="#wm#"/>
+  <p:tag name="KSO_WM_UNIT_ISNUMDGMTITLE" val="0"/>
+</p:tagLst>
+</file>
+
 <file path=ppt/tags/tag29.xml><?xml version="1.0" encoding="utf-8"?>
 <p:tagLst xmlns:a="http://schemas.openxmlformats.org/drawingml/2006/main" xmlns:r="http://schemas.openxmlformats.org/officeDocument/2006/relationships" xmlns:p="http://schemas.openxmlformats.org/presentationml/2006/main">
   <p:tag name="KSO_WM_UNIT_HIGHLIGHT" val="0"/>
@@ -35328,6 +36845,169 @@
   <p:tag name="KSO_WM_UNIT_LAYERLEVEL" val="1"/>
   <p:tag name="KSO_WM_TAG_VERSION" val="1.0"/>
   <p:tag name="KSO_WM_BEAUTIFY_FLAG" val="#wm#"/>
+</p:tagLst>
+</file>
+
+<file path=ppt/tags/tag290.xml><?xml version="1.0" encoding="utf-8"?>
+<p:tagLst xmlns:a="http://schemas.openxmlformats.org/drawingml/2006/main" xmlns:r="http://schemas.openxmlformats.org/officeDocument/2006/relationships" xmlns:p="http://schemas.openxmlformats.org/presentationml/2006/main">
+  <p:tag name="KSO_WM_UNIT_PRESET_TEXT" val="单击此处添加文本具体内容，简明扼要的阐述您的观点。"/>
+  <p:tag name="KSO_WM_UNIT_NOCLEAR" val="0"/>
+  <p:tag name="KSO_WM_UNIT_VALUE" val="50"/>
+  <p:tag name="KSO_WM_UNIT_HIGHLIGHT" val="0"/>
+  <p:tag name="KSO_WM_UNIT_COMPATIBLE" val="0"/>
+  <p:tag name="KSO_WM_UNIT_DIAGRAM_ISNUMVISUAL" val="0"/>
+  <p:tag name="KSO_WM_UNIT_DIAGRAM_ISREFERUNIT" val="0"/>
+  <p:tag name="KSO_WM_UNIT_TYPE" val="f"/>
+  <p:tag name="KSO_WM_UNIT_INDEX" val="2"/>
+  <p:tag name="KSO_WM_UNIT_ID" val="custom20202582_13*f*2"/>
+  <p:tag name="KSO_WM_TEMPLATE_CATEGORY" val="custom"/>
+  <p:tag name="KSO_WM_TEMPLATE_INDEX" val="20202582"/>
+  <p:tag name="KSO_WM_UNIT_LAYERLEVEL" val="1"/>
+  <p:tag name="KSO_WM_TAG_VERSION" val="1.0"/>
+  <p:tag name="KSO_WM_BEAUTIFY_FLAG" val="#wm#"/>
+  <p:tag name="KSO_WM_UNIT_SUBTYPE" val="a"/>
+</p:tagLst>
+</file>
+
+<file path=ppt/tags/tag291.xml><?xml version="1.0" encoding="utf-8"?>
+<p:tagLst xmlns:a="http://schemas.openxmlformats.org/drawingml/2006/main" xmlns:r="http://schemas.openxmlformats.org/officeDocument/2006/relationships" xmlns:p="http://schemas.openxmlformats.org/presentationml/2006/main">
+  <p:tag name="TABLE_ENDDRAG_ORIGIN_RECT" val="129*99"/>
+  <p:tag name="TABLE_ENDDRAG_RECT" val="612*107*129*99"/>
+</p:tagLst>
+</file>
+
+<file path=ppt/tags/tag292.xml><?xml version="1.0" encoding="utf-8"?>
+<p:tagLst xmlns:a="http://schemas.openxmlformats.org/drawingml/2006/main" xmlns:r="http://schemas.openxmlformats.org/officeDocument/2006/relationships" xmlns:p="http://schemas.openxmlformats.org/presentationml/2006/main">
+  <p:tag name="TABLE_ENDDRAG_ORIGIN_RECT" val="129*99"/>
+  <p:tag name="TABLE_ENDDRAG_RECT" val="612*107*129*99"/>
+</p:tagLst>
+</file>
+
+<file path=ppt/tags/tag293.xml><?xml version="1.0" encoding="utf-8"?>
+<p:tagLst xmlns:a="http://schemas.openxmlformats.org/drawingml/2006/main" xmlns:r="http://schemas.openxmlformats.org/officeDocument/2006/relationships" xmlns:p="http://schemas.openxmlformats.org/presentationml/2006/main">
+  <p:tag name="KSO_WM_SLIDE_ID" val="custom20202582_13"/>
+  <p:tag name="KSO_WM_TEMPLATE_SUBCATEGORY" val="0"/>
+  <p:tag name="KSO_WM_TEMPLATE_MASTER_TYPE" val="1"/>
+  <p:tag name="KSO_WM_TEMPLATE_COLOR_TYPE" val="1"/>
+  <p:tag name="KSO_WM_SLIDE_TYPE" val="text"/>
+  <p:tag name="KSO_WM_SLIDE_SUBTYPE" val="picTxt"/>
+  <p:tag name="KSO_WM_SLIDE_ITEM_CNT" val="0"/>
+  <p:tag name="KSO_WM_SLIDE_INDEX" val="13"/>
+  <p:tag name="KSO_WM_SLIDE_SIZE" val="869*422"/>
+  <p:tag name="KSO_WM_SLIDE_POSITION" val="45*18"/>
+  <p:tag name="KSO_WM_TAG_VERSION" val="1.0"/>
+  <p:tag name="KSO_WM_BEAUTIFY_FLAG" val="#wm#"/>
+  <p:tag name="KSO_WM_TEMPLATE_CATEGORY" val="custom"/>
+  <p:tag name="KSO_WM_TEMPLATE_INDEX" val="20202582"/>
+  <p:tag name="KSO_WM_SLIDE_LAYOUT" val="a_d_f"/>
+  <p:tag name="KSO_WM_SLIDE_LAYOUT_CNT" val="1_2_2"/>
+</p:tagLst>
+</file>
+
+<file path=ppt/tags/tag294.xml><?xml version="1.0" encoding="utf-8"?>
+<p:tagLst xmlns:a="http://schemas.openxmlformats.org/drawingml/2006/main" xmlns:r="http://schemas.openxmlformats.org/officeDocument/2006/relationships" xmlns:p="http://schemas.openxmlformats.org/presentationml/2006/main">
+  <p:tag name="KSO_WM_UNIT_ISCONTENTSTITLE" val="0"/>
+  <p:tag name="KSO_WM_UNIT_PRESET_TEXT" val="单击此处添加标题"/>
+  <p:tag name="KSO_WM_UNIT_NOCLEAR" val="0"/>
+  <p:tag name="KSO_WM_UNIT_VALUE" val="42"/>
+  <p:tag name="KSO_WM_UNIT_HIGHLIGHT" val="0"/>
+  <p:tag name="KSO_WM_UNIT_COMPATIBLE" val="0"/>
+  <p:tag name="KSO_WM_UNIT_DIAGRAM_ISNUMVISUAL" val="0"/>
+  <p:tag name="KSO_WM_UNIT_DIAGRAM_ISREFERUNIT" val="0"/>
+  <p:tag name="KSO_WM_UNIT_TYPE" val="a"/>
+  <p:tag name="KSO_WM_UNIT_INDEX" val="1"/>
+  <p:tag name="KSO_WM_UNIT_ID" val="custom20202582_13*a*1"/>
+  <p:tag name="KSO_WM_TEMPLATE_CATEGORY" val="custom"/>
+  <p:tag name="KSO_WM_TEMPLATE_INDEX" val="20202582"/>
+  <p:tag name="KSO_WM_UNIT_LAYERLEVEL" val="1"/>
+  <p:tag name="KSO_WM_TAG_VERSION" val="1.0"/>
+  <p:tag name="KSO_WM_BEAUTIFY_FLAG" val="#wm#"/>
+  <p:tag name="KSO_WM_UNIT_ISNUMDGMTITLE" val="0"/>
+</p:tagLst>
+</file>
+
+<file path=ppt/tags/tag295.xml><?xml version="1.0" encoding="utf-8"?>
+<p:tagLst xmlns:a="http://schemas.openxmlformats.org/drawingml/2006/main" xmlns:r="http://schemas.openxmlformats.org/officeDocument/2006/relationships" xmlns:p="http://schemas.openxmlformats.org/presentationml/2006/main">
+  <p:tag name="KSO_WM_UNIT_PRESET_TEXT" val="单击此处添加文本具体内容，简明扼要的阐述您的观点。"/>
+  <p:tag name="KSO_WM_UNIT_NOCLEAR" val="0"/>
+  <p:tag name="KSO_WM_UNIT_VALUE" val="50"/>
+  <p:tag name="KSO_WM_UNIT_HIGHLIGHT" val="0"/>
+  <p:tag name="KSO_WM_UNIT_COMPATIBLE" val="0"/>
+  <p:tag name="KSO_WM_UNIT_DIAGRAM_ISNUMVISUAL" val="0"/>
+  <p:tag name="KSO_WM_UNIT_DIAGRAM_ISREFERUNIT" val="0"/>
+  <p:tag name="KSO_WM_UNIT_TYPE" val="f"/>
+  <p:tag name="KSO_WM_UNIT_INDEX" val="2"/>
+  <p:tag name="KSO_WM_UNIT_ID" val="custom20202582_13*f*2"/>
+  <p:tag name="KSO_WM_TEMPLATE_CATEGORY" val="custom"/>
+  <p:tag name="KSO_WM_TEMPLATE_INDEX" val="20202582"/>
+  <p:tag name="KSO_WM_UNIT_LAYERLEVEL" val="1"/>
+  <p:tag name="KSO_WM_TAG_VERSION" val="1.0"/>
+  <p:tag name="KSO_WM_BEAUTIFY_FLAG" val="#wm#"/>
+  <p:tag name="KSO_WM_UNIT_SUBTYPE" val="a"/>
+</p:tagLst>
+</file>
+
+<file path=ppt/tags/tag296.xml><?xml version="1.0" encoding="utf-8"?>
+<p:tagLst xmlns:a="http://schemas.openxmlformats.org/drawingml/2006/main" xmlns:r="http://schemas.openxmlformats.org/officeDocument/2006/relationships" xmlns:p="http://schemas.openxmlformats.org/presentationml/2006/main">
+  <p:tag name="KSO_WM_SLIDE_ID" val="custom20202582_13"/>
+  <p:tag name="KSO_WM_TEMPLATE_SUBCATEGORY" val="0"/>
+  <p:tag name="KSO_WM_TEMPLATE_MASTER_TYPE" val="1"/>
+  <p:tag name="KSO_WM_TEMPLATE_COLOR_TYPE" val="1"/>
+  <p:tag name="KSO_WM_SLIDE_TYPE" val="text"/>
+  <p:tag name="KSO_WM_SLIDE_SUBTYPE" val="picTxt"/>
+  <p:tag name="KSO_WM_SLIDE_ITEM_CNT" val="0"/>
+  <p:tag name="KSO_WM_SLIDE_INDEX" val="13"/>
+  <p:tag name="KSO_WM_SLIDE_SIZE" val="869*422"/>
+  <p:tag name="KSO_WM_SLIDE_POSITION" val="45*18"/>
+  <p:tag name="KSO_WM_TAG_VERSION" val="1.0"/>
+  <p:tag name="KSO_WM_BEAUTIFY_FLAG" val="#wm#"/>
+  <p:tag name="KSO_WM_TEMPLATE_CATEGORY" val="custom"/>
+  <p:tag name="KSO_WM_TEMPLATE_INDEX" val="20202582"/>
+  <p:tag name="KSO_WM_SLIDE_LAYOUT" val="a_d_f"/>
+  <p:tag name="KSO_WM_SLIDE_LAYOUT_CNT" val="1_2_2"/>
+</p:tagLst>
+</file>
+
+<file path=ppt/tags/tag297.xml><?xml version="1.0" encoding="utf-8"?>
+<p:tagLst xmlns:a="http://schemas.openxmlformats.org/drawingml/2006/main" xmlns:r="http://schemas.openxmlformats.org/officeDocument/2006/relationships" xmlns:p="http://schemas.openxmlformats.org/presentationml/2006/main">
+  <p:tag name="KSO_WM_UNIT_ISCONTENTSTITLE" val="0"/>
+  <p:tag name="KSO_WM_UNIT_PRESET_TEXT" val="单击此处添加标题"/>
+  <p:tag name="KSO_WM_UNIT_NOCLEAR" val="0"/>
+  <p:tag name="KSO_WM_UNIT_VALUE" val="42"/>
+  <p:tag name="KSO_WM_UNIT_HIGHLIGHT" val="0"/>
+  <p:tag name="KSO_WM_UNIT_COMPATIBLE" val="0"/>
+  <p:tag name="KSO_WM_UNIT_DIAGRAM_ISNUMVISUAL" val="0"/>
+  <p:tag name="KSO_WM_UNIT_DIAGRAM_ISREFERUNIT" val="0"/>
+  <p:tag name="KSO_WM_UNIT_TYPE" val="a"/>
+  <p:tag name="KSO_WM_UNIT_INDEX" val="1"/>
+  <p:tag name="KSO_WM_UNIT_ID" val="custom20202582_13*a*1"/>
+  <p:tag name="KSO_WM_TEMPLATE_CATEGORY" val="custom"/>
+  <p:tag name="KSO_WM_TEMPLATE_INDEX" val="20202582"/>
+  <p:tag name="KSO_WM_UNIT_LAYERLEVEL" val="1"/>
+  <p:tag name="KSO_WM_TAG_VERSION" val="1.0"/>
+  <p:tag name="KSO_WM_BEAUTIFY_FLAG" val="#wm#"/>
+  <p:tag name="KSO_WM_UNIT_ISNUMDGMTITLE" val="0"/>
+</p:tagLst>
+</file>
+
+<file path=ppt/tags/tag298.xml><?xml version="1.0" encoding="utf-8"?>
+<p:tagLst xmlns:a="http://schemas.openxmlformats.org/drawingml/2006/main" xmlns:r="http://schemas.openxmlformats.org/officeDocument/2006/relationships" xmlns:p="http://schemas.openxmlformats.org/presentationml/2006/main">
+  <p:tag name="KSO_WM_UNIT_PRESET_TEXT" val="单击此处添加文本具体内容，简明扼要的阐述您的观点。"/>
+  <p:tag name="KSO_WM_UNIT_NOCLEAR" val="0"/>
+  <p:tag name="KSO_WM_UNIT_VALUE" val="50"/>
+  <p:tag name="KSO_WM_UNIT_HIGHLIGHT" val="0"/>
+  <p:tag name="KSO_WM_UNIT_COMPATIBLE" val="0"/>
+  <p:tag name="KSO_WM_UNIT_DIAGRAM_ISNUMVISUAL" val="0"/>
+  <p:tag name="KSO_WM_UNIT_DIAGRAM_ISREFERUNIT" val="0"/>
+  <p:tag name="KSO_WM_UNIT_TYPE" val="f"/>
+  <p:tag name="KSO_WM_UNIT_INDEX" val="2"/>
+  <p:tag name="KSO_WM_UNIT_ID" val="custom20202582_13*f*2"/>
+  <p:tag name="KSO_WM_TEMPLATE_CATEGORY" val="custom"/>
+  <p:tag name="KSO_WM_TEMPLATE_INDEX" val="20202582"/>
+  <p:tag name="KSO_WM_UNIT_LAYERLEVEL" val="1"/>
+  <p:tag name="KSO_WM_TAG_VERSION" val="1.0"/>
+  <p:tag name="KSO_WM_BEAUTIFY_FLAG" val="#wm#"/>
+  <p:tag name="KSO_WM_UNIT_SUBTYPE" val="a"/>
 </p:tagLst>
 </file>
 

</xml_diff>